<commit_message>
Final Slides and PDF
</commit_message>
<xml_diff>
--- a/Documents/Slides/Identity-AuthorizeExerciseMVC.pptx
+++ b/Documents/Slides/Identity-AuthorizeExerciseMVC.pptx
@@ -4256,15 +4256,7 @@
             </a:pPr>
             <a:r>
               <a:rPr lang="en-US" sz="3200" dirty="0" smtClean="0"/>
-              <a:t>Authorization </a:t>
-            </a:r>
-            <a:r>
-              <a:rPr lang="en-US" sz="3200" dirty="0" smtClean="0"/>
-              <a:t>in MVC </a:t>
-            </a:r>
-            <a:r>
-              <a:rPr lang="en-US" sz="3200" dirty="0" smtClean="0"/>
-              <a:t>5 using ASP.NET Identity</a:t>
+              <a:t>Authorization in MVC 5 using ASP.NET Identity</a:t>
             </a:r>
             <a:endParaRPr lang="en-US" sz="3200" dirty="0"/>
           </a:p>
@@ -4536,15 +4528,7 @@
             </a:pPr>
             <a:r>
               <a:rPr lang="en-US" dirty="0" smtClean="0"/>
-              <a:t>The authorization attribute can also be used to check if </a:t>
-            </a:r>
-            <a:r>
-              <a:rPr lang="en-US" dirty="0" smtClean="0"/>
-              <a:t>an </a:t>
-            </a:r>
-            <a:r>
-              <a:rPr lang="en-US" dirty="0" smtClean="0"/>
-              <a:t>identity is in a specific role or is a user </a:t>
+              <a:t>The authorization attribute can also be used to check if an identity is in a specific role or is a user </a:t>
             </a:r>
           </a:p>
           <a:p>

</xml_diff>